<commit_message>
add command to start virtual machines
</commit_message>
<xml_diff>
--- a/sample/kubernetes/offsite/Bring your own device - Teil 1.pptx
+++ b/sample/kubernetes/offsite/Bring your own device - Teil 1.pptx
@@ -5,7 +5,7 @@
     <p:sldMasterId id="2147483648" r:id="rId1"/>
   </p:sldMasterIdLst>
   <p:notesMasterIdLst>
-    <p:notesMasterId r:id="rId16"/>
+    <p:notesMasterId r:id="rId17"/>
   </p:notesMasterIdLst>
   <p:sldIdLst>
     <p:sldId id="256" r:id="rId2"/>
@@ -14,14 +14,15 @@
     <p:sldId id="258" r:id="rId5"/>
     <p:sldId id="259" r:id="rId6"/>
     <p:sldId id="278" r:id="rId7"/>
-    <p:sldId id="265" r:id="rId8"/>
-    <p:sldId id="266" r:id="rId9"/>
-    <p:sldId id="272" r:id="rId10"/>
-    <p:sldId id="267" r:id="rId11"/>
-    <p:sldId id="269" r:id="rId12"/>
-    <p:sldId id="274" r:id="rId13"/>
-    <p:sldId id="270" r:id="rId14"/>
-    <p:sldId id="273" r:id="rId15"/>
+    <p:sldId id="280" r:id="rId8"/>
+    <p:sldId id="265" r:id="rId9"/>
+    <p:sldId id="266" r:id="rId10"/>
+    <p:sldId id="272" r:id="rId11"/>
+    <p:sldId id="267" r:id="rId12"/>
+    <p:sldId id="269" r:id="rId13"/>
+    <p:sldId id="274" r:id="rId14"/>
+    <p:sldId id="270" r:id="rId15"/>
+    <p:sldId id="273" r:id="rId16"/>
   </p:sldIdLst>
   <p:sldSz cx="12192000" cy="6858000"/>
   <p:notesSz cx="6858000" cy="9144000"/>
@@ -210,7 +211,7 @@
           <a:p>
             <a:fld id="{5CCD219F-F703-C14B-A05B-DA5DAB0DC4D2}" type="datetimeFigureOut">
               <a:rPr lang="de-DE" smtClean="0"/>
-              <a:t>10.03.23</a:t>
+              <a:t>12.03.23</a:t>
             </a:fld>
             <a:endParaRPr lang="de-DE"/>
           </a:p>
@@ -729,6 +730,90 @@
 </p:notes>
 </file>
 
+<file path=ppt/notesSlides/notesSlide4.xml><?xml version="1.0" encoding="utf-8"?>
+<p:notes xmlns:a="http://schemas.openxmlformats.org/drawingml/2006/main" xmlns:r="http://schemas.openxmlformats.org/officeDocument/2006/relationships" xmlns:p="http://schemas.openxmlformats.org/presentationml/2006/main">
+  <p:cSld>
+    <p:spTree>
+      <p:nvGrpSpPr>
+        <p:cNvPr id="1" name=""/>
+        <p:cNvGrpSpPr/>
+        <p:nvPr/>
+      </p:nvGrpSpPr>
+      <p:grpSpPr>
+        <a:xfrm>
+          <a:off x="0" y="0"/>
+          <a:ext cx="0" cy="0"/>
+          <a:chOff x="0" y="0"/>
+          <a:chExt cx="0" cy="0"/>
+        </a:xfrm>
+      </p:grpSpPr>
+      <p:sp>
+        <p:nvSpPr>
+          <p:cNvPr id="2" name="Folienbildplatzhalter 1"/>
+          <p:cNvSpPr>
+            <a:spLocks noGrp="1" noRot="1" noChangeAspect="1"/>
+          </p:cNvSpPr>
+          <p:nvPr>
+            <p:ph type="sldImg"/>
+          </p:nvPr>
+        </p:nvSpPr>
+        <p:spPr/>
+      </p:sp>
+      <p:sp>
+        <p:nvSpPr>
+          <p:cNvPr id="3" name="Notizenplatzhalter 2"/>
+          <p:cNvSpPr>
+            <a:spLocks noGrp="1"/>
+          </p:cNvSpPr>
+          <p:nvPr>
+            <p:ph type="body" idx="1"/>
+          </p:nvPr>
+        </p:nvSpPr>
+        <p:spPr/>
+        <p:txBody>
+          <a:bodyPr/>
+          <a:lstStyle/>
+          <a:p>
+            <a:endParaRPr lang="de-DE" dirty="0"/>
+          </a:p>
+        </p:txBody>
+      </p:sp>
+      <p:sp>
+        <p:nvSpPr>
+          <p:cNvPr id="4" name="Foliennummernplatzhalter 3"/>
+          <p:cNvSpPr>
+            <a:spLocks noGrp="1"/>
+          </p:cNvSpPr>
+          <p:nvPr>
+            <p:ph type="sldNum" sz="quarter" idx="5"/>
+          </p:nvPr>
+        </p:nvSpPr>
+        <p:spPr/>
+        <p:txBody>
+          <a:bodyPr/>
+          <a:lstStyle/>
+          <a:p>
+            <a:fld id="{430D2433-C2A2-F54F-B5A8-3B6039D09A1B}" type="slidenum">
+              <a:rPr lang="de-DE" smtClean="0"/>
+              <a:t>7</a:t>
+            </a:fld>
+            <a:endParaRPr lang="de-DE"/>
+          </a:p>
+        </p:txBody>
+      </p:sp>
+    </p:spTree>
+    <p:extLst>
+      <p:ext uri="{BB962C8B-B14F-4D97-AF65-F5344CB8AC3E}">
+        <p14:creationId xmlns:p14="http://schemas.microsoft.com/office/powerpoint/2010/main" val="4241453182"/>
+      </p:ext>
+    </p:extLst>
+  </p:cSld>
+  <p:clrMapOvr>
+    <a:masterClrMapping/>
+  </p:clrMapOvr>
+</p:notes>
+</file>
+
 <file path=ppt/slideLayouts/slideLayout1.xml><?xml version="1.0" encoding="utf-8"?>
 <p:sldLayout xmlns:a="http://schemas.openxmlformats.org/drawingml/2006/main" xmlns:r="http://schemas.openxmlformats.org/officeDocument/2006/relationships" xmlns:p="http://schemas.openxmlformats.org/presentationml/2006/main" type="title" preserve="1">
   <p:cSld name="Titelfolie">
@@ -876,7 +961,7 @@
           <a:p>
             <a:fld id="{6B40B35D-B481-DF4E-B1B0-2B6288A3F72B}" type="datetimeFigureOut">
               <a:rPr lang="de-DE" smtClean="0"/>
-              <a:t>10.03.23</a:t>
+              <a:t>12.03.23</a:t>
             </a:fld>
             <a:endParaRPr lang="de-DE"/>
           </a:p>
@@ -1074,7 +1159,7 @@
           <a:p>
             <a:fld id="{6B40B35D-B481-DF4E-B1B0-2B6288A3F72B}" type="datetimeFigureOut">
               <a:rPr lang="de-DE" smtClean="0"/>
-              <a:t>10.03.23</a:t>
+              <a:t>12.03.23</a:t>
             </a:fld>
             <a:endParaRPr lang="de-DE"/>
           </a:p>
@@ -1282,7 +1367,7 @@
           <a:p>
             <a:fld id="{6B40B35D-B481-DF4E-B1B0-2B6288A3F72B}" type="datetimeFigureOut">
               <a:rPr lang="de-DE" smtClean="0"/>
-              <a:t>10.03.23</a:t>
+              <a:t>12.03.23</a:t>
             </a:fld>
             <a:endParaRPr lang="de-DE"/>
           </a:p>
@@ -1480,7 +1565,7 @@
           <a:p>
             <a:fld id="{6B40B35D-B481-DF4E-B1B0-2B6288A3F72B}" type="datetimeFigureOut">
               <a:rPr lang="de-DE" smtClean="0"/>
-              <a:t>10.03.23</a:t>
+              <a:t>12.03.23</a:t>
             </a:fld>
             <a:endParaRPr lang="de-DE"/>
           </a:p>
@@ -1755,7 +1840,7 @@
           <a:p>
             <a:fld id="{6B40B35D-B481-DF4E-B1B0-2B6288A3F72B}" type="datetimeFigureOut">
               <a:rPr lang="de-DE" smtClean="0"/>
-              <a:t>10.03.23</a:t>
+              <a:t>12.03.23</a:t>
             </a:fld>
             <a:endParaRPr lang="de-DE"/>
           </a:p>
@@ -2020,7 +2105,7 @@
           <a:p>
             <a:fld id="{6B40B35D-B481-DF4E-B1B0-2B6288A3F72B}" type="datetimeFigureOut">
               <a:rPr lang="de-DE" smtClean="0"/>
-              <a:t>10.03.23</a:t>
+              <a:t>12.03.23</a:t>
             </a:fld>
             <a:endParaRPr lang="de-DE"/>
           </a:p>
@@ -2432,7 +2517,7 @@
           <a:p>
             <a:fld id="{6B40B35D-B481-DF4E-B1B0-2B6288A3F72B}" type="datetimeFigureOut">
               <a:rPr lang="de-DE" smtClean="0"/>
-              <a:t>10.03.23</a:t>
+              <a:t>12.03.23</a:t>
             </a:fld>
             <a:endParaRPr lang="de-DE"/>
           </a:p>
@@ -2573,7 +2658,7 @@
           <a:p>
             <a:fld id="{6B40B35D-B481-DF4E-B1B0-2B6288A3F72B}" type="datetimeFigureOut">
               <a:rPr lang="de-DE" smtClean="0"/>
-              <a:t>10.03.23</a:t>
+              <a:t>12.03.23</a:t>
             </a:fld>
             <a:endParaRPr lang="de-DE"/>
           </a:p>
@@ -2686,7 +2771,7 @@
           <a:p>
             <a:fld id="{6B40B35D-B481-DF4E-B1B0-2B6288A3F72B}" type="datetimeFigureOut">
               <a:rPr lang="de-DE" smtClean="0"/>
-              <a:t>10.03.23</a:t>
+              <a:t>12.03.23</a:t>
             </a:fld>
             <a:endParaRPr lang="de-DE"/>
           </a:p>
@@ -2997,7 +3082,7 @@
           <a:p>
             <a:fld id="{6B40B35D-B481-DF4E-B1B0-2B6288A3F72B}" type="datetimeFigureOut">
               <a:rPr lang="de-DE" smtClean="0"/>
-              <a:t>10.03.23</a:t>
+              <a:t>12.03.23</a:t>
             </a:fld>
             <a:endParaRPr lang="de-DE"/>
           </a:p>
@@ -3285,7 +3370,7 @@
           <a:p>
             <a:fld id="{6B40B35D-B481-DF4E-B1B0-2B6288A3F72B}" type="datetimeFigureOut">
               <a:rPr lang="de-DE" smtClean="0"/>
-              <a:t>10.03.23</a:t>
+              <a:t>12.03.23</a:t>
             </a:fld>
             <a:endParaRPr lang="de-DE"/>
           </a:p>
@@ -3526,7 +3611,7 @@
           <a:p>
             <a:fld id="{6B40B35D-B481-DF4E-B1B0-2B6288A3F72B}" type="datetimeFigureOut">
               <a:rPr lang="de-DE" smtClean="0"/>
-              <a:t>10.03.23</a:t>
+              <a:t>12.03.23</a:t>
             </a:fld>
             <a:endParaRPr lang="de-DE"/>
           </a:p>
@@ -4134,6 +4219,198 @@
           <a:lstStyle/>
           <a:p>
             <a:r>
+              <a:rPr lang="de-DE" dirty="0">
+                <a:cs typeface="Courier New" panose="02070309020205020404" pitchFamily="49" charset="0"/>
+              </a:rPr>
+              <a:t>Bitte das Token kopieren!</a:t>
+            </a:r>
+          </a:p>
+          <a:p>
+            <a:pPr marL="0" indent="0">
+              <a:buNone/>
+            </a:pPr>
+            <a:r>
+              <a:rPr lang="de-DE" dirty="0">
+                <a:latin typeface="Courier New" panose="02070309020205020404" pitchFamily="49" charset="0"/>
+                <a:cs typeface="Courier New" panose="02070309020205020404" pitchFamily="49" charset="0"/>
+              </a:rPr>
+              <a:t>	</a:t>
+            </a:r>
+          </a:p>
+        </p:txBody>
+      </p:sp>
+      <p:pic>
+        <p:nvPicPr>
+          <p:cNvPr id="4" name="Grafik 3">
+            <a:extLst>
+              <a:ext uri="{FF2B5EF4-FFF2-40B4-BE49-F238E27FC236}">
+                <a16:creationId xmlns:a16="http://schemas.microsoft.com/office/drawing/2014/main" id="{2D007CEF-3EC6-BDB3-7DE3-A93C924F6D36}"/>
+              </a:ext>
+            </a:extLst>
+          </p:cNvPr>
+          <p:cNvPicPr>
+            <a:picLocks noChangeAspect="1"/>
+          </p:cNvPicPr>
+          <p:nvPr/>
+        </p:nvPicPr>
+        <p:blipFill>
+          <a:blip r:embed="rId2"/>
+          <a:stretch>
+            <a:fillRect/>
+          </a:stretch>
+        </p:blipFill>
+        <p:spPr>
+          <a:xfrm>
+            <a:off x="20587" y="2548572"/>
+            <a:ext cx="12150825" cy="1760855"/>
+          </a:xfrm>
+          <a:prstGeom prst="rect">
+            <a:avLst/>
+          </a:prstGeom>
+        </p:spPr>
+      </p:pic>
+      <p:sp>
+        <p:nvSpPr>
+          <p:cNvPr id="5" name="Oval 4">
+            <a:extLst>
+              <a:ext uri="{FF2B5EF4-FFF2-40B4-BE49-F238E27FC236}">
+                <a16:creationId xmlns:a16="http://schemas.microsoft.com/office/drawing/2014/main" id="{A98F5722-1B8D-908E-9B20-4508E1C8C87C}"/>
+              </a:ext>
+            </a:extLst>
+          </p:cNvPr>
+          <p:cNvSpPr/>
+          <p:nvPr/>
+        </p:nvSpPr>
+        <p:spPr>
+          <a:xfrm>
+            <a:off x="112394" y="3392804"/>
+            <a:ext cx="11967210" cy="1051560"/>
+          </a:xfrm>
+          <a:prstGeom prst="ellipse">
+            <a:avLst/>
+          </a:prstGeom>
+          <a:noFill/>
+          <a:ln w="38100">
+            <a:solidFill>
+              <a:srgbClr val="FF0000"/>
+            </a:solidFill>
+          </a:ln>
+        </p:spPr>
+        <p:style>
+          <a:lnRef idx="2">
+            <a:schemeClr val="accent1">
+              <a:shade val="50000"/>
+            </a:schemeClr>
+          </a:lnRef>
+          <a:fillRef idx="1">
+            <a:schemeClr val="accent1"/>
+          </a:fillRef>
+          <a:effectRef idx="0">
+            <a:schemeClr val="accent1"/>
+          </a:effectRef>
+          <a:fontRef idx="minor">
+            <a:schemeClr val="lt1"/>
+          </a:fontRef>
+        </p:style>
+        <p:txBody>
+          <a:bodyPr rtlCol="0" anchor="ctr"/>
+          <a:lstStyle/>
+          <a:p>
+            <a:pPr algn="ctr"/>
+            <a:endParaRPr lang="de-DE"/>
+          </a:p>
+        </p:txBody>
+      </p:sp>
+    </p:spTree>
+    <p:extLst>
+      <p:ext uri="{BB962C8B-B14F-4D97-AF65-F5344CB8AC3E}">
+        <p14:creationId xmlns:p14="http://schemas.microsoft.com/office/powerpoint/2010/main" val="1791239617"/>
+      </p:ext>
+    </p:extLst>
+  </p:cSld>
+  <p:clrMapOvr>
+    <a:masterClrMapping/>
+  </p:clrMapOvr>
+</p:sld>
+</file>
+
+<file path=ppt/slides/slide11.xml><?xml version="1.0" encoding="utf-8"?>
+<p:sld xmlns:a="http://schemas.openxmlformats.org/drawingml/2006/main" xmlns:r="http://schemas.openxmlformats.org/officeDocument/2006/relationships" xmlns:p="http://schemas.openxmlformats.org/presentationml/2006/main">
+  <p:cSld>
+    <p:spTree>
+      <p:nvGrpSpPr>
+        <p:cNvPr id="1" name=""/>
+        <p:cNvGrpSpPr/>
+        <p:nvPr/>
+      </p:nvGrpSpPr>
+      <p:grpSpPr>
+        <a:xfrm>
+          <a:off x="0" y="0"/>
+          <a:ext cx="0" cy="0"/>
+          <a:chOff x="0" y="0"/>
+          <a:chExt cx="0" cy="0"/>
+        </a:xfrm>
+      </p:grpSpPr>
+      <p:sp>
+        <p:nvSpPr>
+          <p:cNvPr id="2" name="Titel 1">
+            <a:extLst>
+              <a:ext uri="{FF2B5EF4-FFF2-40B4-BE49-F238E27FC236}">
+                <a16:creationId xmlns:a16="http://schemas.microsoft.com/office/drawing/2014/main" id="{54472761-F6BA-A4DF-6E97-094AE60B729E}"/>
+              </a:ext>
+            </a:extLst>
+          </p:cNvPr>
+          <p:cNvSpPr>
+            <a:spLocks noGrp="1"/>
+          </p:cNvSpPr>
+          <p:nvPr>
+            <p:ph type="title"/>
+          </p:nvPr>
+        </p:nvSpPr>
+        <p:spPr/>
+        <p:txBody>
+          <a:bodyPr/>
+          <a:lstStyle/>
+          <a:p>
+            <a:r>
+              <a:rPr lang="de-DE" dirty="0"/>
+              <a:t>Master </a:t>
+            </a:r>
+            <a:r>
+              <a:rPr lang="de-DE" dirty="0" err="1"/>
+              <a:t>Node</a:t>
+            </a:r>
+            <a:r>
+              <a:rPr lang="de-DE" dirty="0"/>
+              <a:t> einrichten</a:t>
+            </a:r>
+          </a:p>
+        </p:txBody>
+      </p:sp>
+      <p:sp>
+        <p:nvSpPr>
+          <p:cNvPr id="3" name="Inhaltsplatzhalter 2">
+            <a:extLst>
+              <a:ext uri="{FF2B5EF4-FFF2-40B4-BE49-F238E27FC236}">
+                <a16:creationId xmlns:a16="http://schemas.microsoft.com/office/drawing/2014/main" id="{A6C84D30-D395-411D-5201-F8BC8F103909}"/>
+              </a:ext>
+            </a:extLst>
+          </p:cNvPr>
+          <p:cNvSpPr>
+            <a:spLocks noGrp="1"/>
+          </p:cNvSpPr>
+          <p:nvPr>
+            <p:ph idx="1"/>
+          </p:nvPr>
+        </p:nvSpPr>
+        <p:spPr/>
+        <p:txBody>
+          <a:bodyPr>
+            <a:normAutofit/>
+          </a:bodyPr>
+          <a:lstStyle/>
+          <a:p>
+            <a:r>
               <a:rPr lang="de-DE" dirty="0" err="1"/>
               <a:t>Kubernetes</a:t>
             </a:r>
@@ -4328,7 +4605,7 @@
 </p:sld>
 </file>
 
-<file path=ppt/slides/slide11.xml><?xml version="1.0" encoding="utf-8"?>
+<file path=ppt/slides/slide12.xml><?xml version="1.0" encoding="utf-8"?>
 <p:sld xmlns:a="http://schemas.openxmlformats.org/drawingml/2006/main" xmlns:r="http://schemas.openxmlformats.org/officeDocument/2006/relationships" xmlns:p="http://schemas.openxmlformats.org/presentationml/2006/main">
   <p:cSld>
     <p:spTree>
@@ -4618,7 +4895,7 @@
 </p:sld>
 </file>
 
-<file path=ppt/slides/slide12.xml><?xml version="1.0" encoding="utf-8"?>
+<file path=ppt/slides/slide13.xml><?xml version="1.0" encoding="utf-8"?>
 <p:sld xmlns:a="http://schemas.openxmlformats.org/drawingml/2006/main" xmlns:r="http://schemas.openxmlformats.org/officeDocument/2006/relationships" xmlns:p="http://schemas.openxmlformats.org/presentationml/2006/main">
   <p:cSld>
     <p:spTree>
@@ -4805,7 +5082,7 @@
 </p:sld>
 </file>
 
-<file path=ppt/slides/slide13.xml><?xml version="1.0" encoding="utf-8"?>
+<file path=ppt/slides/slide14.xml><?xml version="1.0" encoding="utf-8"?>
 <p:sld xmlns:a="http://schemas.openxmlformats.org/drawingml/2006/main" xmlns:r="http://schemas.openxmlformats.org/officeDocument/2006/relationships" xmlns:p="http://schemas.openxmlformats.org/presentationml/2006/main">
   <p:cSld>
     <p:spTree>
@@ -4945,7 +5222,7 @@
 </p:sld>
 </file>
 
-<file path=ppt/slides/slide14.xml><?xml version="1.0" encoding="utf-8"?>
+<file path=ppt/slides/slide15.xml><?xml version="1.0" encoding="utf-8"?>
 <p:sld xmlns:a="http://schemas.openxmlformats.org/drawingml/2006/main" xmlns:r="http://schemas.openxmlformats.org/officeDocument/2006/relationships" xmlns:p="http://schemas.openxmlformats.org/presentationml/2006/main">
   <p:cSld>
     <p:spTree>
@@ -5855,7 +6132,7 @@
           <a:p>
             <a:r>
               <a:rPr lang="de-DE" dirty="0"/>
-              <a:t>IP-Adressen in Hosts-Datei eintragen (1):	</a:t>
+              <a:t>Virtuelle Maschinen starten:	</a:t>
             </a:r>
           </a:p>
           <a:p>
@@ -5874,230 +6151,43 @@
                 <a:latin typeface="Courier New" panose="02070309020205020404" pitchFamily="49" charset="0"/>
                 <a:cs typeface="Courier New" panose="02070309020205020404" pitchFamily="49" charset="0"/>
               </a:rPr>
-              <a:t>list</a:t>
+              <a:t>start</a:t>
+            </a:r>
+            <a:r>
+              <a:rPr lang="de-DE" sz="2400" dirty="0">
+                <a:latin typeface="Courier New" panose="02070309020205020404" pitchFamily="49" charset="0"/>
+                <a:cs typeface="Courier New" panose="02070309020205020404" pitchFamily="49" charset="0"/>
+              </a:rPr>
+              <a:t> </a:t>
+            </a:r>
+            <a:r>
+              <a:rPr lang="de-DE" sz="2400" dirty="0" err="1">
+                <a:latin typeface="Courier New" panose="02070309020205020404" pitchFamily="49" charset="0"/>
+                <a:cs typeface="Courier New" panose="02070309020205020404" pitchFamily="49" charset="0"/>
+              </a:rPr>
+              <a:t>master</a:t>
+            </a:r>
+            <a:r>
+              <a:rPr lang="de-DE" sz="2400" dirty="0">
+                <a:latin typeface="Courier New" panose="02070309020205020404" pitchFamily="49" charset="0"/>
+                <a:cs typeface="Courier New" panose="02070309020205020404" pitchFamily="49" charset="0"/>
+              </a:rPr>
+              <a:t> worker1 worker2 </a:t>
+            </a:r>
+            <a:r>
+              <a:rPr lang="de-DE" sz="2400" dirty="0" err="1">
+                <a:latin typeface="Courier New" panose="02070309020205020404" pitchFamily="49" charset="0"/>
+                <a:cs typeface="Courier New" panose="02070309020205020404" pitchFamily="49" charset="0"/>
+              </a:rPr>
+              <a:t>db</a:t>
             </a:r>
             <a:endParaRPr lang="de-DE" sz="2400" dirty="0">
               <a:latin typeface="Courier New" panose="02070309020205020404" pitchFamily="49" charset="0"/>
               <a:cs typeface="Courier New" panose="02070309020205020404" pitchFamily="49" charset="0"/>
             </a:endParaRPr>
           </a:p>
-          <a:p>
-            <a:pPr marL="0" indent="0">
-              <a:buNone/>
-            </a:pPr>
-            <a:endParaRPr lang="de-DE" sz="2400" dirty="0">
-              <a:latin typeface="Courier New" panose="02070309020205020404" pitchFamily="49" charset="0"/>
-              <a:cs typeface="Courier New" panose="02070309020205020404" pitchFamily="49" charset="0"/>
-            </a:endParaRPr>
-          </a:p>
-          <a:p>
-            <a:pPr marL="0" indent="0">
-              <a:buNone/>
-            </a:pPr>
-            <a:endParaRPr lang="de-DE" sz="2400" dirty="0">
-              <a:latin typeface="Courier New" panose="02070309020205020404" pitchFamily="49" charset="0"/>
-              <a:cs typeface="Courier New" panose="02070309020205020404" pitchFamily="49" charset="0"/>
-            </a:endParaRPr>
-          </a:p>
-          <a:p>
-            <a:pPr marL="0" indent="0">
-              <a:buNone/>
-            </a:pPr>
-            <a:endParaRPr lang="de-DE" sz="2400" dirty="0">
-              <a:latin typeface="Courier New" panose="02070309020205020404" pitchFamily="49" charset="0"/>
-              <a:cs typeface="Courier New" panose="02070309020205020404" pitchFamily="49" charset="0"/>
-            </a:endParaRPr>
-          </a:p>
-          <a:p>
-            <a:pPr marL="0" indent="0">
-              <a:buNone/>
-            </a:pPr>
-            <a:r>
-              <a:rPr lang="de-DE" sz="2400" dirty="0">
-                <a:latin typeface="Courier New" panose="02070309020205020404" pitchFamily="49" charset="0"/>
-                <a:cs typeface="Courier New" panose="02070309020205020404" pitchFamily="49" charset="0"/>
-              </a:rPr>
-              <a:t>	</a:t>
-            </a:r>
-          </a:p>
-          <a:p>
-            <a:pPr marL="0" indent="0">
-              <a:buNone/>
-            </a:pPr>
-            <a:r>
-              <a:rPr lang="de-DE" sz="2400" dirty="0">
-                <a:latin typeface="Courier New" panose="02070309020205020404" pitchFamily="49" charset="0"/>
-                <a:cs typeface="Courier New" panose="02070309020205020404" pitchFamily="49" charset="0"/>
-              </a:rPr>
-              <a:t>	multipass </a:t>
-            </a:r>
-            <a:r>
-              <a:rPr lang="de-DE" sz="2400" dirty="0" err="1">
-                <a:latin typeface="Courier New" panose="02070309020205020404" pitchFamily="49" charset="0"/>
-                <a:cs typeface="Courier New" panose="02070309020205020404" pitchFamily="49" charset="0"/>
-              </a:rPr>
-              <a:t>shell</a:t>
-            </a:r>
-            <a:r>
-              <a:rPr lang="de-DE" sz="2400" dirty="0">
-                <a:latin typeface="Courier New" panose="02070309020205020404" pitchFamily="49" charset="0"/>
-                <a:cs typeface="Courier New" panose="02070309020205020404" pitchFamily="49" charset="0"/>
-              </a:rPr>
-              <a:t> </a:t>
-            </a:r>
-            <a:r>
-              <a:rPr lang="de-DE" sz="2400" dirty="0" err="1">
-                <a:latin typeface="Courier New" panose="02070309020205020404" pitchFamily="49" charset="0"/>
-                <a:cs typeface="Courier New" panose="02070309020205020404" pitchFamily="49" charset="0"/>
-              </a:rPr>
-              <a:t>master</a:t>
-            </a:r>
-            <a:endParaRPr lang="de-DE" sz="2400" dirty="0">
-              <a:latin typeface="Courier New" panose="02070309020205020404" pitchFamily="49" charset="0"/>
-              <a:cs typeface="Courier New" panose="02070309020205020404" pitchFamily="49" charset="0"/>
-            </a:endParaRPr>
-          </a:p>
-          <a:p>
-            <a:pPr marL="0" indent="0">
-              <a:buNone/>
-            </a:pPr>
-            <a:r>
-              <a:rPr lang="de-DE" sz="2400" dirty="0">
-                <a:latin typeface="Courier New" panose="02070309020205020404" pitchFamily="49" charset="0"/>
-                <a:cs typeface="Courier New" panose="02070309020205020404" pitchFamily="49" charset="0"/>
-              </a:rPr>
-              <a:t>	</a:t>
-            </a:r>
-            <a:r>
-              <a:rPr lang="de-DE" sz="2400" dirty="0" err="1">
-                <a:latin typeface="Courier New" panose="02070309020205020404" pitchFamily="49" charset="0"/>
-                <a:cs typeface="Courier New" panose="02070309020205020404" pitchFamily="49" charset="0"/>
-              </a:rPr>
-              <a:t>sudo</a:t>
-            </a:r>
-            <a:r>
-              <a:rPr lang="de-DE" sz="2400" dirty="0">
-                <a:latin typeface="Courier New" panose="02070309020205020404" pitchFamily="49" charset="0"/>
-                <a:cs typeface="Courier New" panose="02070309020205020404" pitchFamily="49" charset="0"/>
-              </a:rPr>
-              <a:t> vi /</a:t>
-            </a:r>
-            <a:r>
-              <a:rPr lang="de-DE" sz="2400" dirty="0" err="1">
-                <a:latin typeface="Courier New" panose="02070309020205020404" pitchFamily="49" charset="0"/>
-                <a:cs typeface="Courier New" panose="02070309020205020404" pitchFamily="49" charset="0"/>
-              </a:rPr>
-              <a:t>etc</a:t>
-            </a:r>
-            <a:r>
-              <a:rPr lang="de-DE" sz="2400" dirty="0">
-                <a:latin typeface="Courier New" panose="02070309020205020404" pitchFamily="49" charset="0"/>
-                <a:cs typeface="Courier New" panose="02070309020205020404" pitchFamily="49" charset="0"/>
-              </a:rPr>
-              <a:t>/</a:t>
-            </a:r>
-            <a:r>
-              <a:rPr lang="de-DE" sz="2400" dirty="0" err="1">
-                <a:latin typeface="Courier New" panose="02070309020205020404" pitchFamily="49" charset="0"/>
-                <a:cs typeface="Courier New" panose="02070309020205020404" pitchFamily="49" charset="0"/>
-              </a:rPr>
-              <a:t>cloud</a:t>
-            </a:r>
-            <a:r>
-              <a:rPr lang="de-DE" sz="2400" dirty="0">
-                <a:latin typeface="Courier New" panose="02070309020205020404" pitchFamily="49" charset="0"/>
-                <a:cs typeface="Courier New" panose="02070309020205020404" pitchFamily="49" charset="0"/>
-              </a:rPr>
-              <a:t>/</a:t>
-            </a:r>
-            <a:r>
-              <a:rPr lang="de-DE" sz="2400" dirty="0" err="1">
-                <a:latin typeface="Courier New" panose="02070309020205020404" pitchFamily="49" charset="0"/>
-                <a:cs typeface="Courier New" panose="02070309020205020404" pitchFamily="49" charset="0"/>
-              </a:rPr>
-              <a:t>templates</a:t>
-            </a:r>
-            <a:r>
-              <a:rPr lang="de-DE" sz="2400" dirty="0">
-                <a:latin typeface="Courier New" panose="02070309020205020404" pitchFamily="49" charset="0"/>
-                <a:cs typeface="Courier New" panose="02070309020205020404" pitchFamily="49" charset="0"/>
-              </a:rPr>
-              <a:t>/</a:t>
-            </a:r>
-            <a:r>
-              <a:rPr lang="de-DE" sz="2400" dirty="0" err="1">
-                <a:latin typeface="Courier New" panose="02070309020205020404" pitchFamily="49" charset="0"/>
-                <a:cs typeface="Courier New" panose="02070309020205020404" pitchFamily="49" charset="0"/>
-              </a:rPr>
-              <a:t>hosts.debian.tmpl</a:t>
-            </a:r>
-            <a:endParaRPr lang="de-DE" sz="2400" dirty="0">
-              <a:latin typeface="Courier New" panose="02070309020205020404" pitchFamily="49" charset="0"/>
-              <a:cs typeface="Courier New" panose="02070309020205020404" pitchFamily="49" charset="0"/>
-            </a:endParaRPr>
-          </a:p>
-        </p:txBody>
-      </p:sp>
-      <p:pic>
-        <p:nvPicPr>
-          <p:cNvPr id="7" name="Grafik 6">
-            <a:extLst>
-              <a:ext uri="{FF2B5EF4-FFF2-40B4-BE49-F238E27FC236}">
-                <a16:creationId xmlns:a16="http://schemas.microsoft.com/office/drawing/2014/main" id="{C4C2B3E5-3DB5-B1F5-1E08-21EA9EB81FF0}"/>
-              </a:ext>
-            </a:extLst>
-          </p:cNvPr>
-          <p:cNvPicPr>
-            <a:picLocks noChangeAspect="1"/>
-          </p:cNvPicPr>
-          <p:nvPr/>
-        </p:nvPicPr>
-        <p:blipFill>
-          <a:blip r:embed="rId3"/>
-          <a:stretch>
-            <a:fillRect/>
-          </a:stretch>
-        </p:blipFill>
-        <p:spPr>
-          <a:xfrm>
-            <a:off x="4445000" y="5567112"/>
-            <a:ext cx="2901950" cy="962226"/>
-          </a:xfrm>
-          <a:prstGeom prst="rect">
-            <a:avLst/>
-          </a:prstGeom>
-        </p:spPr>
-      </p:pic>
-      <p:pic>
-        <p:nvPicPr>
-          <p:cNvPr id="6" name="Grafik 5">
-            <a:extLst>
-              <a:ext uri="{FF2B5EF4-FFF2-40B4-BE49-F238E27FC236}">
-                <a16:creationId xmlns:a16="http://schemas.microsoft.com/office/drawing/2014/main" id="{90CB199C-3DF3-D431-995A-55C20BBA7296}"/>
-              </a:ext>
-            </a:extLst>
-          </p:cNvPr>
-          <p:cNvPicPr>
-            <a:picLocks noChangeAspect="1"/>
-          </p:cNvPicPr>
-          <p:nvPr/>
-        </p:nvPicPr>
-        <p:blipFill>
-          <a:blip r:embed="rId4"/>
-          <a:stretch>
-            <a:fillRect/>
-          </a:stretch>
-        </p:blipFill>
-        <p:spPr>
-          <a:xfrm>
-            <a:off x="4521200" y="3124869"/>
-            <a:ext cx="6832600" cy="1143000"/>
-          </a:xfrm>
-          <a:prstGeom prst="rect">
-            <a:avLst/>
-          </a:prstGeom>
-        </p:spPr>
-      </p:pic>
+        </p:txBody>
+      </p:sp>
     </p:spTree>
     <p:extLst>
       <p:ext uri="{BB962C8B-B14F-4D97-AF65-F5344CB8AC3E}">
@@ -6133,7 +6223,7 @@
           <p:cNvPr id="2" name="Titel 1">
             <a:extLst>
               <a:ext uri="{FF2B5EF4-FFF2-40B4-BE49-F238E27FC236}">
-                <a16:creationId xmlns:a16="http://schemas.microsoft.com/office/drawing/2014/main" id="{54472761-F6BA-A4DF-6E97-094AE60B729E}"/>
+                <a16:creationId xmlns:a16="http://schemas.microsoft.com/office/drawing/2014/main" id="{97B81511-FD40-5DFB-A11C-439D47FC7E4E}"/>
               </a:ext>
             </a:extLst>
           </p:cNvPr>
@@ -6169,7 +6259,7 @@
           <p:cNvPr id="3" name="Inhaltsplatzhalter 2">
             <a:extLst>
               <a:ext uri="{FF2B5EF4-FFF2-40B4-BE49-F238E27FC236}">
-                <a16:creationId xmlns:a16="http://schemas.microsoft.com/office/drawing/2014/main" id="{A6C84D30-D395-411D-5201-F8BC8F103909}"/>
+                <a16:creationId xmlns:a16="http://schemas.microsoft.com/office/drawing/2014/main" id="{D60DEAA2-318F-E89B-9305-4E4F17176745}"/>
               </a:ext>
             </a:extLst>
           </p:cNvPr>
@@ -6189,7 +6279,7 @@
           <a:p>
             <a:r>
               <a:rPr lang="de-DE" dirty="0"/>
-              <a:t>IP-Adressen in Hosts-Datei eintragen (2):</a:t>
+              <a:t>IP-Adressen in Hosts-Datei eintragen (1):	</a:t>
             </a:r>
           </a:p>
           <a:p>
@@ -6201,56 +6291,14 @@
                 <a:latin typeface="Courier New" panose="02070309020205020404" pitchFamily="49" charset="0"/>
                 <a:cs typeface="Courier New" panose="02070309020205020404" pitchFamily="49" charset="0"/>
               </a:rPr>
-              <a:t>	</a:t>
+              <a:t>	multipass </a:t>
             </a:r>
             <a:r>
               <a:rPr lang="de-DE" sz="2400" dirty="0" err="1">
                 <a:latin typeface="Courier New" panose="02070309020205020404" pitchFamily="49" charset="0"/>
                 <a:cs typeface="Courier New" panose="02070309020205020404" pitchFamily="49" charset="0"/>
               </a:rPr>
-              <a:t>sudo</a:t>
-            </a:r>
-            <a:r>
-              <a:rPr lang="de-DE" sz="2400" dirty="0">
-                <a:latin typeface="Courier New" panose="02070309020205020404" pitchFamily="49" charset="0"/>
-                <a:cs typeface="Courier New" panose="02070309020205020404" pitchFamily="49" charset="0"/>
-              </a:rPr>
-              <a:t> </a:t>
-            </a:r>
-            <a:r>
-              <a:rPr lang="de-DE" sz="2400" dirty="0" err="1">
-                <a:latin typeface="Courier New" panose="02070309020205020404" pitchFamily="49" charset="0"/>
-                <a:cs typeface="Courier New" panose="02070309020205020404" pitchFamily="49" charset="0"/>
-              </a:rPr>
-              <a:t>shutdown</a:t>
-            </a:r>
-            <a:r>
-              <a:rPr lang="de-DE" sz="2400" dirty="0">
-                <a:latin typeface="Courier New" panose="02070309020205020404" pitchFamily="49" charset="0"/>
-                <a:cs typeface="Courier New" panose="02070309020205020404" pitchFamily="49" charset="0"/>
-              </a:rPr>
-              <a:t> -</a:t>
-            </a:r>
-            <a:r>
-              <a:rPr lang="de-DE" sz="2400" dirty="0" err="1">
-                <a:latin typeface="Courier New" panose="02070309020205020404" pitchFamily="49" charset="0"/>
-                <a:cs typeface="Courier New" panose="02070309020205020404" pitchFamily="49" charset="0"/>
-              </a:rPr>
-              <a:t>r</a:t>
-            </a:r>
-            <a:r>
-              <a:rPr lang="de-DE" sz="2400" dirty="0">
-                <a:latin typeface="Courier New" panose="02070309020205020404" pitchFamily="49" charset="0"/>
-                <a:cs typeface="Courier New" panose="02070309020205020404" pitchFamily="49" charset="0"/>
-              </a:rPr>
-              <a:t> </a:t>
-            </a:r>
-            <a:r>
-              <a:rPr lang="de-DE" sz="2400" dirty="0" err="1">
-                <a:latin typeface="Courier New" panose="02070309020205020404" pitchFamily="49" charset="0"/>
-                <a:cs typeface="Courier New" panose="02070309020205020404" pitchFamily="49" charset="0"/>
-              </a:rPr>
-              <a:t>now</a:t>
+              <a:t>list</a:t>
             </a:r>
             <a:endParaRPr lang="de-DE" sz="2400" dirty="0">
               <a:latin typeface="Courier New" panose="02070309020205020404" pitchFamily="49" charset="0"/>
@@ -6258,20 +6306,226 @@
             </a:endParaRPr>
           </a:p>
           <a:p>
-            <a:pPr lvl="1"/>
-            <a:r>
-              <a:rPr lang="de-DE" dirty="0">
-                <a:cs typeface="Courier New" panose="02070309020205020404" pitchFamily="49" charset="0"/>
-              </a:rPr>
-              <a:t>Kurz warten: VM startet neu</a:t>
-            </a:r>
-          </a:p>
-        </p:txBody>
-      </p:sp>
+            <a:pPr marL="0" indent="0">
+              <a:buNone/>
+            </a:pPr>
+            <a:endParaRPr lang="de-DE" sz="2400" dirty="0">
+              <a:latin typeface="Courier New" panose="02070309020205020404" pitchFamily="49" charset="0"/>
+              <a:cs typeface="Courier New" panose="02070309020205020404" pitchFamily="49" charset="0"/>
+            </a:endParaRPr>
+          </a:p>
+          <a:p>
+            <a:pPr marL="0" indent="0">
+              <a:buNone/>
+            </a:pPr>
+            <a:endParaRPr lang="de-DE" sz="2400" dirty="0">
+              <a:latin typeface="Courier New" panose="02070309020205020404" pitchFamily="49" charset="0"/>
+              <a:cs typeface="Courier New" panose="02070309020205020404" pitchFamily="49" charset="0"/>
+            </a:endParaRPr>
+          </a:p>
+          <a:p>
+            <a:pPr marL="0" indent="0">
+              <a:buNone/>
+            </a:pPr>
+            <a:endParaRPr lang="de-DE" sz="2400" dirty="0">
+              <a:latin typeface="Courier New" panose="02070309020205020404" pitchFamily="49" charset="0"/>
+              <a:cs typeface="Courier New" panose="02070309020205020404" pitchFamily="49" charset="0"/>
+            </a:endParaRPr>
+          </a:p>
+          <a:p>
+            <a:pPr marL="0" indent="0">
+              <a:buNone/>
+            </a:pPr>
+            <a:r>
+              <a:rPr lang="de-DE" sz="2400" dirty="0">
+                <a:latin typeface="Courier New" panose="02070309020205020404" pitchFamily="49" charset="0"/>
+                <a:cs typeface="Courier New" panose="02070309020205020404" pitchFamily="49" charset="0"/>
+              </a:rPr>
+              <a:t>	</a:t>
+            </a:r>
+          </a:p>
+          <a:p>
+            <a:pPr marL="0" indent="0">
+              <a:buNone/>
+            </a:pPr>
+            <a:r>
+              <a:rPr lang="de-DE" sz="2400" dirty="0">
+                <a:latin typeface="Courier New" panose="02070309020205020404" pitchFamily="49" charset="0"/>
+                <a:cs typeface="Courier New" panose="02070309020205020404" pitchFamily="49" charset="0"/>
+              </a:rPr>
+              <a:t>	multipass </a:t>
+            </a:r>
+            <a:r>
+              <a:rPr lang="de-DE" sz="2400" dirty="0" err="1">
+                <a:latin typeface="Courier New" panose="02070309020205020404" pitchFamily="49" charset="0"/>
+                <a:cs typeface="Courier New" panose="02070309020205020404" pitchFamily="49" charset="0"/>
+              </a:rPr>
+              <a:t>shell</a:t>
+            </a:r>
+            <a:r>
+              <a:rPr lang="de-DE" sz="2400" dirty="0">
+                <a:latin typeface="Courier New" panose="02070309020205020404" pitchFamily="49" charset="0"/>
+                <a:cs typeface="Courier New" panose="02070309020205020404" pitchFamily="49" charset="0"/>
+              </a:rPr>
+              <a:t> </a:t>
+            </a:r>
+            <a:r>
+              <a:rPr lang="de-DE" sz="2400" dirty="0" err="1">
+                <a:latin typeface="Courier New" panose="02070309020205020404" pitchFamily="49" charset="0"/>
+                <a:cs typeface="Courier New" panose="02070309020205020404" pitchFamily="49" charset="0"/>
+              </a:rPr>
+              <a:t>master</a:t>
+            </a:r>
+            <a:endParaRPr lang="de-DE" sz="2400" dirty="0">
+              <a:latin typeface="Courier New" panose="02070309020205020404" pitchFamily="49" charset="0"/>
+              <a:cs typeface="Courier New" panose="02070309020205020404" pitchFamily="49" charset="0"/>
+            </a:endParaRPr>
+          </a:p>
+          <a:p>
+            <a:pPr marL="0" indent="0">
+              <a:buNone/>
+            </a:pPr>
+            <a:r>
+              <a:rPr lang="de-DE" sz="2400" dirty="0">
+                <a:latin typeface="Courier New" panose="02070309020205020404" pitchFamily="49" charset="0"/>
+                <a:cs typeface="Courier New" panose="02070309020205020404" pitchFamily="49" charset="0"/>
+              </a:rPr>
+              <a:t>	</a:t>
+            </a:r>
+            <a:r>
+              <a:rPr lang="de-DE" sz="2400" dirty="0" err="1">
+                <a:latin typeface="Courier New" panose="02070309020205020404" pitchFamily="49" charset="0"/>
+                <a:cs typeface="Courier New" panose="02070309020205020404" pitchFamily="49" charset="0"/>
+              </a:rPr>
+              <a:t>sudo</a:t>
+            </a:r>
+            <a:r>
+              <a:rPr lang="de-DE" sz="2400" dirty="0">
+                <a:latin typeface="Courier New" panose="02070309020205020404" pitchFamily="49" charset="0"/>
+                <a:cs typeface="Courier New" panose="02070309020205020404" pitchFamily="49" charset="0"/>
+              </a:rPr>
+              <a:t> vi /</a:t>
+            </a:r>
+            <a:r>
+              <a:rPr lang="de-DE" sz="2400" dirty="0" err="1">
+                <a:latin typeface="Courier New" panose="02070309020205020404" pitchFamily="49" charset="0"/>
+                <a:cs typeface="Courier New" panose="02070309020205020404" pitchFamily="49" charset="0"/>
+              </a:rPr>
+              <a:t>etc</a:t>
+            </a:r>
+            <a:r>
+              <a:rPr lang="de-DE" sz="2400" dirty="0">
+                <a:latin typeface="Courier New" panose="02070309020205020404" pitchFamily="49" charset="0"/>
+                <a:cs typeface="Courier New" panose="02070309020205020404" pitchFamily="49" charset="0"/>
+              </a:rPr>
+              <a:t>/</a:t>
+            </a:r>
+            <a:r>
+              <a:rPr lang="de-DE" sz="2400" dirty="0" err="1">
+                <a:latin typeface="Courier New" panose="02070309020205020404" pitchFamily="49" charset="0"/>
+                <a:cs typeface="Courier New" panose="02070309020205020404" pitchFamily="49" charset="0"/>
+              </a:rPr>
+              <a:t>cloud</a:t>
+            </a:r>
+            <a:r>
+              <a:rPr lang="de-DE" sz="2400" dirty="0">
+                <a:latin typeface="Courier New" panose="02070309020205020404" pitchFamily="49" charset="0"/>
+                <a:cs typeface="Courier New" panose="02070309020205020404" pitchFamily="49" charset="0"/>
+              </a:rPr>
+              <a:t>/</a:t>
+            </a:r>
+            <a:r>
+              <a:rPr lang="de-DE" sz="2400" dirty="0" err="1">
+                <a:latin typeface="Courier New" panose="02070309020205020404" pitchFamily="49" charset="0"/>
+                <a:cs typeface="Courier New" panose="02070309020205020404" pitchFamily="49" charset="0"/>
+              </a:rPr>
+              <a:t>templates</a:t>
+            </a:r>
+            <a:r>
+              <a:rPr lang="de-DE" sz="2400" dirty="0">
+                <a:latin typeface="Courier New" panose="02070309020205020404" pitchFamily="49" charset="0"/>
+                <a:cs typeface="Courier New" panose="02070309020205020404" pitchFamily="49" charset="0"/>
+              </a:rPr>
+              <a:t>/</a:t>
+            </a:r>
+            <a:r>
+              <a:rPr lang="de-DE" sz="2400" dirty="0" err="1">
+                <a:latin typeface="Courier New" panose="02070309020205020404" pitchFamily="49" charset="0"/>
+                <a:cs typeface="Courier New" panose="02070309020205020404" pitchFamily="49" charset="0"/>
+              </a:rPr>
+              <a:t>hosts.debian.tmpl</a:t>
+            </a:r>
+            <a:endParaRPr lang="de-DE" sz="2400" dirty="0">
+              <a:latin typeface="Courier New" panose="02070309020205020404" pitchFamily="49" charset="0"/>
+              <a:cs typeface="Courier New" panose="02070309020205020404" pitchFamily="49" charset="0"/>
+            </a:endParaRPr>
+          </a:p>
+        </p:txBody>
+      </p:sp>
+      <p:pic>
+        <p:nvPicPr>
+          <p:cNvPr id="7" name="Grafik 6">
+            <a:extLst>
+              <a:ext uri="{FF2B5EF4-FFF2-40B4-BE49-F238E27FC236}">
+                <a16:creationId xmlns:a16="http://schemas.microsoft.com/office/drawing/2014/main" id="{C4C2B3E5-3DB5-B1F5-1E08-21EA9EB81FF0}"/>
+              </a:ext>
+            </a:extLst>
+          </p:cNvPr>
+          <p:cNvPicPr>
+            <a:picLocks noChangeAspect="1"/>
+          </p:cNvPicPr>
+          <p:nvPr/>
+        </p:nvPicPr>
+        <p:blipFill>
+          <a:blip r:embed="rId3"/>
+          <a:stretch>
+            <a:fillRect/>
+          </a:stretch>
+        </p:blipFill>
+        <p:spPr>
+          <a:xfrm>
+            <a:off x="4445000" y="5567112"/>
+            <a:ext cx="2901950" cy="962226"/>
+          </a:xfrm>
+          <a:prstGeom prst="rect">
+            <a:avLst/>
+          </a:prstGeom>
+        </p:spPr>
+      </p:pic>
+      <p:pic>
+        <p:nvPicPr>
+          <p:cNvPr id="6" name="Grafik 5">
+            <a:extLst>
+              <a:ext uri="{FF2B5EF4-FFF2-40B4-BE49-F238E27FC236}">
+                <a16:creationId xmlns:a16="http://schemas.microsoft.com/office/drawing/2014/main" id="{90CB199C-3DF3-D431-995A-55C20BBA7296}"/>
+              </a:ext>
+            </a:extLst>
+          </p:cNvPr>
+          <p:cNvPicPr>
+            <a:picLocks noChangeAspect="1"/>
+          </p:cNvPicPr>
+          <p:nvPr/>
+        </p:nvPicPr>
+        <p:blipFill>
+          <a:blip r:embed="rId4"/>
+          <a:stretch>
+            <a:fillRect/>
+          </a:stretch>
+        </p:blipFill>
+        <p:spPr>
+          <a:xfrm>
+            <a:off x="4521200" y="3124869"/>
+            <a:ext cx="6832600" cy="1143000"/>
+          </a:xfrm>
+          <a:prstGeom prst="rect">
+            <a:avLst/>
+          </a:prstGeom>
+        </p:spPr>
+      </p:pic>
     </p:spTree>
     <p:extLst>
       <p:ext uri="{BB962C8B-B14F-4D97-AF65-F5344CB8AC3E}">
-        <p14:creationId xmlns:p14="http://schemas.microsoft.com/office/powerpoint/2010/main" val="1270310899"/>
+        <p14:creationId xmlns:p14="http://schemas.microsoft.com/office/powerpoint/2010/main" val="3801918226"/>
       </p:ext>
     </p:extLst>
   </p:cSld>
@@ -6358,38 +6612,27 @@
           <a:lstStyle/>
           <a:p>
             <a:r>
-              <a:rPr lang="de-DE" dirty="0" err="1"/>
-              <a:t>Kubernetes</a:t>
-            </a:r>
-            <a:r>
-              <a:rPr lang="de-DE" dirty="0"/>
-              <a:t> einrichten:</a:t>
+              <a:rPr lang="de-DE" dirty="0"/>
+              <a:t>IP-Adressen in Hosts-Datei eintragen (2):</a:t>
             </a:r>
           </a:p>
           <a:p>
             <a:pPr marL="0" indent="0">
               <a:buNone/>
             </a:pPr>
-            <a:r>
-              <a:rPr lang="de-DE" dirty="0">
-                <a:latin typeface="Courier New" panose="02070309020205020404" pitchFamily="49" charset="0"/>
-                <a:cs typeface="Courier New" panose="02070309020205020404" pitchFamily="49" charset="0"/>
-              </a:rPr>
-              <a:t>	</a:t>
-            </a:r>
             <a:r>
               <a:rPr lang="de-DE" sz="2400" dirty="0">
                 <a:latin typeface="Courier New" panose="02070309020205020404" pitchFamily="49" charset="0"/>
                 <a:cs typeface="Courier New" panose="02070309020205020404" pitchFamily="49" charset="0"/>
               </a:rPr>
-              <a:t>multipass </a:t>
+              <a:t>	</a:t>
             </a:r>
             <a:r>
               <a:rPr lang="de-DE" sz="2400" dirty="0" err="1">
                 <a:latin typeface="Courier New" panose="02070309020205020404" pitchFamily="49" charset="0"/>
                 <a:cs typeface="Courier New" panose="02070309020205020404" pitchFamily="49" charset="0"/>
               </a:rPr>
-              <a:t>shell</a:t>
+              <a:t>sudo</a:t>
             </a:r>
             <a:r>
               <a:rPr lang="de-DE" sz="2400" dirty="0">
@@ -6403,75 +6646,35 @@
                 <a:latin typeface="Courier New" panose="02070309020205020404" pitchFamily="49" charset="0"/>
                 <a:cs typeface="Courier New" panose="02070309020205020404" pitchFamily="49" charset="0"/>
               </a:rPr>
-              <a:t>master</a:t>
+              <a:t>shutdown</a:t>
             </a:r>
             <a:r>
               <a:rPr lang="de-DE" sz="2400" dirty="0">
                 <a:latin typeface="Courier New" panose="02070309020205020404" pitchFamily="49" charset="0"/>
                 <a:cs typeface="Courier New" panose="02070309020205020404" pitchFamily="49" charset="0"/>
               </a:rPr>
-              <a:t> </a:t>
-            </a:r>
-          </a:p>
-          <a:p>
-            <a:pPr marL="0" indent="0">
-              <a:buNone/>
-            </a:pPr>
+              <a:t> -</a:t>
+            </a:r>
+            <a:r>
+              <a:rPr lang="de-DE" sz="2400" dirty="0" err="1">
+                <a:latin typeface="Courier New" panose="02070309020205020404" pitchFamily="49" charset="0"/>
+                <a:cs typeface="Courier New" panose="02070309020205020404" pitchFamily="49" charset="0"/>
+              </a:rPr>
+              <a:t>r</a:t>
+            </a:r>
             <a:r>
               <a:rPr lang="de-DE" sz="2400" dirty="0">
                 <a:latin typeface="Courier New" panose="02070309020205020404" pitchFamily="49" charset="0"/>
                 <a:cs typeface="Courier New" panose="02070309020205020404" pitchFamily="49" charset="0"/>
               </a:rPr>
-              <a:t>	microk8s </a:t>
+              <a:t> </a:t>
             </a:r>
             <a:r>
               <a:rPr lang="de-DE" sz="2400" dirty="0" err="1">
                 <a:latin typeface="Courier New" panose="02070309020205020404" pitchFamily="49" charset="0"/>
                 <a:cs typeface="Courier New" panose="02070309020205020404" pitchFamily="49" charset="0"/>
               </a:rPr>
-              <a:t>enable</a:t>
-            </a:r>
-            <a:r>
-              <a:rPr lang="de-DE" sz="2400" dirty="0">
-                <a:latin typeface="Courier New" panose="02070309020205020404" pitchFamily="49" charset="0"/>
-                <a:cs typeface="Courier New" panose="02070309020205020404" pitchFamily="49" charset="0"/>
-              </a:rPr>
-              <a:t> </a:t>
-            </a:r>
-            <a:r>
-              <a:rPr lang="de-DE" sz="2400" dirty="0" err="1">
-                <a:latin typeface="Courier New" panose="02070309020205020404" pitchFamily="49" charset="0"/>
-                <a:cs typeface="Courier New" panose="02070309020205020404" pitchFamily="49" charset="0"/>
-              </a:rPr>
-              <a:t>dns</a:t>
-            </a:r>
-            <a:r>
-              <a:rPr lang="de-DE" sz="2400" dirty="0">
-                <a:latin typeface="Courier New" panose="02070309020205020404" pitchFamily="49" charset="0"/>
-                <a:cs typeface="Courier New" panose="02070309020205020404" pitchFamily="49" charset="0"/>
-              </a:rPr>
-              <a:t> </a:t>
-            </a:r>
-            <a:r>
-              <a:rPr lang="de-DE" sz="2400" dirty="0" err="1">
-                <a:latin typeface="Courier New" panose="02070309020205020404" pitchFamily="49" charset="0"/>
-                <a:cs typeface="Courier New" panose="02070309020205020404" pitchFamily="49" charset="0"/>
-              </a:rPr>
-              <a:t>dashboard</a:t>
-            </a:r>
-            <a:r>
-              <a:rPr lang="de-DE" sz="2400" dirty="0">
-                <a:latin typeface="Courier New" panose="02070309020205020404" pitchFamily="49" charset="0"/>
-                <a:cs typeface="Courier New" panose="02070309020205020404" pitchFamily="49" charset="0"/>
-              </a:rPr>
-              <a:t> </a:t>
-            </a:r>
-            <a:r>
-              <a:rPr lang="de-DE" sz="2400" dirty="0" err="1">
-                <a:latin typeface="Courier New" panose="02070309020205020404" pitchFamily="49" charset="0"/>
-                <a:cs typeface="Courier New" panose="02070309020205020404" pitchFamily="49" charset="0"/>
-              </a:rPr>
-              <a:t>ingress</a:t>
+              <a:t>now</a:t>
             </a:r>
             <a:endParaRPr lang="de-DE" sz="2400" dirty="0">
               <a:latin typeface="Courier New" panose="02070309020205020404" pitchFamily="49" charset="0"/>
@@ -6479,50 +6682,12 @@
             </a:endParaRPr>
           </a:p>
           <a:p>
-            <a:pPr marL="0" indent="0">
-              <a:buNone/>
-            </a:pPr>
-            <a:r>
-              <a:rPr lang="de-DE" sz="2400" dirty="0">
-                <a:latin typeface="Courier New" panose="02070309020205020404" pitchFamily="49" charset="0"/>
-                <a:cs typeface="Courier New" panose="02070309020205020404" pitchFamily="49" charset="0"/>
-              </a:rPr>
-              <a:t>	microk8s </a:t>
-            </a:r>
-            <a:r>
-              <a:rPr lang="de-DE" sz="2400" dirty="0" err="1">
-                <a:latin typeface="Courier New" panose="02070309020205020404" pitchFamily="49" charset="0"/>
-                <a:cs typeface="Courier New" panose="02070309020205020404" pitchFamily="49" charset="0"/>
-              </a:rPr>
-              <a:t>dashboard</a:t>
-            </a:r>
-            <a:r>
-              <a:rPr lang="de-DE" sz="2400" dirty="0">
-                <a:latin typeface="Courier New" panose="02070309020205020404" pitchFamily="49" charset="0"/>
-                <a:cs typeface="Courier New" panose="02070309020205020404" pitchFamily="49" charset="0"/>
-              </a:rPr>
-              <a:t>-proxy</a:t>
-            </a:r>
-          </a:p>
-          <a:p>
             <a:pPr lvl="1"/>
             <a:r>
               <a:rPr lang="de-DE" dirty="0">
                 <a:cs typeface="Courier New" panose="02070309020205020404" pitchFamily="49" charset="0"/>
               </a:rPr>
-              <a:t>Bitte warten, das kann ein paar Minuten dauern!</a:t>
-            </a:r>
-          </a:p>
-          <a:p>
-            <a:pPr marL="0" indent="0">
-              <a:buNone/>
-            </a:pPr>
-            <a:r>
-              <a:rPr lang="de-DE" dirty="0">
-                <a:latin typeface="Courier New" panose="02070309020205020404" pitchFamily="49" charset="0"/>
-                <a:cs typeface="Courier New" panose="02070309020205020404" pitchFamily="49" charset="0"/>
-              </a:rPr>
-              <a:t>	</a:t>
+              <a:t>Kurz warten: VM startet neu</a:t>
             </a:r>
           </a:p>
         </p:txBody>
@@ -6530,7 +6695,7 @@
     </p:spTree>
     <p:extLst>
       <p:ext uri="{BB962C8B-B14F-4D97-AF65-F5344CB8AC3E}">
-        <p14:creationId xmlns:p14="http://schemas.microsoft.com/office/powerpoint/2010/main" val="614538028"/>
+        <p14:creationId xmlns:p14="http://schemas.microsoft.com/office/powerpoint/2010/main" val="1270310899"/>
       </p:ext>
     </p:extLst>
   </p:cSld>
@@ -6617,10 +6782,12 @@
           <a:lstStyle/>
           <a:p>
             <a:r>
-              <a:rPr lang="de-DE" dirty="0">
-                <a:cs typeface="Courier New" panose="02070309020205020404" pitchFamily="49" charset="0"/>
-              </a:rPr>
-              <a:t>Bitte das Token kopieren!</a:t>
+              <a:rPr lang="de-DE" dirty="0" err="1"/>
+              <a:t>Kubernetes</a:t>
+            </a:r>
+            <a:r>
+              <a:rPr lang="de-DE" dirty="0"/>
+              <a:t> einrichten:</a:t>
             </a:r>
           </a:p>
           <a:p>
@@ -6634,95 +6801,160 @@
               </a:rPr>
               <a:t>	</a:t>
             </a:r>
-          </a:p>
-        </p:txBody>
-      </p:sp>
-      <p:pic>
-        <p:nvPicPr>
-          <p:cNvPr id="4" name="Grafik 3">
-            <a:extLst>
-              <a:ext uri="{FF2B5EF4-FFF2-40B4-BE49-F238E27FC236}">
-                <a16:creationId xmlns:a16="http://schemas.microsoft.com/office/drawing/2014/main" id="{2D007CEF-3EC6-BDB3-7DE3-A93C924F6D36}"/>
-              </a:ext>
-            </a:extLst>
-          </p:cNvPr>
-          <p:cNvPicPr>
-            <a:picLocks noChangeAspect="1"/>
-          </p:cNvPicPr>
-          <p:nvPr/>
-        </p:nvPicPr>
-        <p:blipFill>
-          <a:blip r:embed="rId2"/>
-          <a:stretch>
-            <a:fillRect/>
-          </a:stretch>
-        </p:blipFill>
-        <p:spPr>
-          <a:xfrm>
-            <a:off x="20587" y="2548572"/>
-            <a:ext cx="12150825" cy="1760855"/>
-          </a:xfrm>
-          <a:prstGeom prst="rect">
-            <a:avLst/>
-          </a:prstGeom>
-        </p:spPr>
-      </p:pic>
-      <p:sp>
-        <p:nvSpPr>
-          <p:cNvPr id="5" name="Oval 4">
-            <a:extLst>
-              <a:ext uri="{FF2B5EF4-FFF2-40B4-BE49-F238E27FC236}">
-                <a16:creationId xmlns:a16="http://schemas.microsoft.com/office/drawing/2014/main" id="{A98F5722-1B8D-908E-9B20-4508E1C8C87C}"/>
-              </a:ext>
-            </a:extLst>
-          </p:cNvPr>
-          <p:cNvSpPr/>
-          <p:nvPr/>
-        </p:nvSpPr>
-        <p:spPr>
-          <a:xfrm>
-            <a:off x="112394" y="3392804"/>
-            <a:ext cx="11967210" cy="1051560"/>
-          </a:xfrm>
-          <a:prstGeom prst="ellipse">
-            <a:avLst/>
-          </a:prstGeom>
-          <a:noFill/>
-          <a:ln w="38100">
-            <a:solidFill>
-              <a:srgbClr val="FF0000"/>
-            </a:solidFill>
-          </a:ln>
-        </p:spPr>
-        <p:style>
-          <a:lnRef idx="2">
-            <a:schemeClr val="accent1">
-              <a:shade val="50000"/>
-            </a:schemeClr>
-          </a:lnRef>
-          <a:fillRef idx="1">
-            <a:schemeClr val="accent1"/>
-          </a:fillRef>
-          <a:effectRef idx="0">
-            <a:schemeClr val="accent1"/>
-          </a:effectRef>
-          <a:fontRef idx="minor">
-            <a:schemeClr val="lt1"/>
-          </a:fontRef>
-        </p:style>
-        <p:txBody>
-          <a:bodyPr rtlCol="0" anchor="ctr"/>
-          <a:lstStyle/>
-          <a:p>
-            <a:pPr algn="ctr"/>
-            <a:endParaRPr lang="de-DE"/>
+            <a:r>
+              <a:rPr lang="de-DE" sz="2400" dirty="0">
+                <a:latin typeface="Courier New" panose="02070309020205020404" pitchFamily="49" charset="0"/>
+                <a:cs typeface="Courier New" panose="02070309020205020404" pitchFamily="49" charset="0"/>
+              </a:rPr>
+              <a:t>multipass </a:t>
+            </a:r>
+            <a:r>
+              <a:rPr lang="de-DE" sz="2400" dirty="0" err="1">
+                <a:latin typeface="Courier New" panose="02070309020205020404" pitchFamily="49" charset="0"/>
+                <a:cs typeface="Courier New" panose="02070309020205020404" pitchFamily="49" charset="0"/>
+              </a:rPr>
+              <a:t>shell</a:t>
+            </a:r>
+            <a:r>
+              <a:rPr lang="de-DE" sz="2400" dirty="0">
+                <a:latin typeface="Courier New" panose="02070309020205020404" pitchFamily="49" charset="0"/>
+                <a:cs typeface="Courier New" panose="02070309020205020404" pitchFamily="49" charset="0"/>
+              </a:rPr>
+              <a:t> </a:t>
+            </a:r>
+            <a:r>
+              <a:rPr lang="de-DE" sz="2400" dirty="0" err="1">
+                <a:latin typeface="Courier New" panose="02070309020205020404" pitchFamily="49" charset="0"/>
+                <a:cs typeface="Courier New" panose="02070309020205020404" pitchFamily="49" charset="0"/>
+              </a:rPr>
+              <a:t>master</a:t>
+            </a:r>
+            <a:r>
+              <a:rPr lang="de-DE" sz="2400" dirty="0">
+                <a:latin typeface="Courier New" panose="02070309020205020404" pitchFamily="49" charset="0"/>
+                <a:cs typeface="Courier New" panose="02070309020205020404" pitchFamily="49" charset="0"/>
+              </a:rPr>
+              <a:t> </a:t>
+            </a:r>
+          </a:p>
+          <a:p>
+            <a:pPr marL="0" indent="0">
+              <a:buNone/>
+            </a:pPr>
+            <a:r>
+              <a:rPr lang="de-DE" sz="2400" dirty="0">
+                <a:latin typeface="Courier New" panose="02070309020205020404" pitchFamily="49" charset="0"/>
+                <a:cs typeface="Courier New" panose="02070309020205020404" pitchFamily="49" charset="0"/>
+              </a:rPr>
+              <a:t>	microk8s </a:t>
+            </a:r>
+            <a:r>
+              <a:rPr lang="de-DE" sz="2400" dirty="0" err="1">
+                <a:latin typeface="Courier New" panose="02070309020205020404" pitchFamily="49" charset="0"/>
+                <a:cs typeface="Courier New" panose="02070309020205020404" pitchFamily="49" charset="0"/>
+              </a:rPr>
+              <a:t>enable</a:t>
+            </a:r>
+            <a:r>
+              <a:rPr lang="de-DE" sz="2400" dirty="0">
+                <a:latin typeface="Courier New" panose="02070309020205020404" pitchFamily="49" charset="0"/>
+                <a:cs typeface="Courier New" panose="02070309020205020404" pitchFamily="49" charset="0"/>
+              </a:rPr>
+              <a:t> </a:t>
+            </a:r>
+            <a:r>
+              <a:rPr lang="de-DE" sz="2400" dirty="0" err="1">
+                <a:latin typeface="Courier New" panose="02070309020205020404" pitchFamily="49" charset="0"/>
+                <a:cs typeface="Courier New" panose="02070309020205020404" pitchFamily="49" charset="0"/>
+              </a:rPr>
+              <a:t>dns</a:t>
+            </a:r>
+            <a:r>
+              <a:rPr lang="de-DE" sz="2400" dirty="0">
+                <a:latin typeface="Courier New" panose="02070309020205020404" pitchFamily="49" charset="0"/>
+                <a:cs typeface="Courier New" panose="02070309020205020404" pitchFamily="49" charset="0"/>
+              </a:rPr>
+              <a:t> </a:t>
+            </a:r>
+            <a:r>
+              <a:rPr lang="de-DE" sz="2400" dirty="0" err="1">
+                <a:latin typeface="Courier New" panose="02070309020205020404" pitchFamily="49" charset="0"/>
+                <a:cs typeface="Courier New" panose="02070309020205020404" pitchFamily="49" charset="0"/>
+              </a:rPr>
+              <a:t>dashboard</a:t>
+            </a:r>
+            <a:r>
+              <a:rPr lang="de-DE" sz="2400" dirty="0">
+                <a:latin typeface="Courier New" panose="02070309020205020404" pitchFamily="49" charset="0"/>
+                <a:cs typeface="Courier New" panose="02070309020205020404" pitchFamily="49" charset="0"/>
+              </a:rPr>
+              <a:t> </a:t>
+            </a:r>
+            <a:r>
+              <a:rPr lang="de-DE" sz="2400" dirty="0" err="1">
+                <a:latin typeface="Courier New" panose="02070309020205020404" pitchFamily="49" charset="0"/>
+                <a:cs typeface="Courier New" panose="02070309020205020404" pitchFamily="49" charset="0"/>
+              </a:rPr>
+              <a:t>ingress</a:t>
+            </a:r>
+            <a:endParaRPr lang="de-DE" sz="2400" dirty="0">
+              <a:latin typeface="Courier New" panose="02070309020205020404" pitchFamily="49" charset="0"/>
+              <a:cs typeface="Courier New" panose="02070309020205020404" pitchFamily="49" charset="0"/>
+            </a:endParaRPr>
+          </a:p>
+          <a:p>
+            <a:pPr marL="0" indent="0">
+              <a:buNone/>
+            </a:pPr>
+            <a:r>
+              <a:rPr lang="de-DE" sz="2400" dirty="0">
+                <a:latin typeface="Courier New" panose="02070309020205020404" pitchFamily="49" charset="0"/>
+                <a:cs typeface="Courier New" panose="02070309020205020404" pitchFamily="49" charset="0"/>
+              </a:rPr>
+              <a:t>	microk8s </a:t>
+            </a:r>
+            <a:r>
+              <a:rPr lang="de-DE" sz="2400" dirty="0" err="1">
+                <a:latin typeface="Courier New" panose="02070309020205020404" pitchFamily="49" charset="0"/>
+                <a:cs typeface="Courier New" panose="02070309020205020404" pitchFamily="49" charset="0"/>
+              </a:rPr>
+              <a:t>dashboard</a:t>
+            </a:r>
+            <a:r>
+              <a:rPr lang="de-DE" sz="2400" dirty="0">
+                <a:latin typeface="Courier New" panose="02070309020205020404" pitchFamily="49" charset="0"/>
+                <a:cs typeface="Courier New" panose="02070309020205020404" pitchFamily="49" charset="0"/>
+              </a:rPr>
+              <a:t>-proxy</a:t>
+            </a:r>
+          </a:p>
+          <a:p>
+            <a:pPr lvl="1"/>
+            <a:r>
+              <a:rPr lang="de-DE" dirty="0">
+                <a:cs typeface="Courier New" panose="02070309020205020404" pitchFamily="49" charset="0"/>
+              </a:rPr>
+              <a:t>Bitte warten, das kann ein paar Minuten dauern!</a:t>
+            </a:r>
+          </a:p>
+          <a:p>
+            <a:pPr marL="0" indent="0">
+              <a:buNone/>
+            </a:pPr>
+            <a:r>
+              <a:rPr lang="de-DE" dirty="0">
+                <a:latin typeface="Courier New" panose="02070309020205020404" pitchFamily="49" charset="0"/>
+                <a:cs typeface="Courier New" panose="02070309020205020404" pitchFamily="49" charset="0"/>
+              </a:rPr>
+              <a:t>	</a:t>
+            </a:r>
           </a:p>
         </p:txBody>
       </p:sp>
     </p:spTree>
     <p:extLst>
       <p:ext uri="{BB962C8B-B14F-4D97-AF65-F5344CB8AC3E}">
-        <p14:creationId xmlns:p14="http://schemas.microsoft.com/office/powerpoint/2010/main" val="1791239617"/>
+        <p14:creationId xmlns:p14="http://schemas.microsoft.com/office/powerpoint/2010/main" val="614538028"/>
       </p:ext>
     </p:extLst>
   </p:cSld>

</xml_diff>